<commit_message>
updated the root in the API and the presentation
</commit_message>
<xml_diff>
--- a/Project Submission/Presentation/Full Presentation.pptx
+++ b/Project Submission/Presentation/Full Presentation.pptx
@@ -19,16 +19,17 @@
     <p:sldId id="276" r:id="rId13"/>
     <p:sldId id="263" r:id="rId14"/>
     <p:sldId id="278" r:id="rId15"/>
-    <p:sldId id="264" r:id="rId16"/>
-    <p:sldId id="265" r:id="rId17"/>
-    <p:sldId id="266" r:id="rId18"/>
-    <p:sldId id="268" r:id="rId19"/>
-    <p:sldId id="270" r:id="rId20"/>
-    <p:sldId id="271" r:id="rId21"/>
-    <p:sldId id="273" r:id="rId22"/>
-    <p:sldId id="274" r:id="rId23"/>
-    <p:sldId id="277" r:id="rId24"/>
-    <p:sldId id="283" r:id="rId25"/>
+    <p:sldId id="284" r:id="rId16"/>
+    <p:sldId id="285" r:id="rId17"/>
+    <p:sldId id="265" r:id="rId18"/>
+    <p:sldId id="266" r:id="rId19"/>
+    <p:sldId id="268" r:id="rId20"/>
+    <p:sldId id="270" r:id="rId21"/>
+    <p:sldId id="271" r:id="rId22"/>
+    <p:sldId id="273" r:id="rId23"/>
+    <p:sldId id="274" r:id="rId24"/>
+    <p:sldId id="277" r:id="rId25"/>
+    <p:sldId id="283" r:id="rId26"/>
   </p:sldIdLst>
   <p:sldSz cx="9144000" cy="6858000" type="screen4x3"/>
   <p:notesSz cx="6858000" cy="9144000"/>
@@ -8747,82 +8748,123 @@
       </p:grpSpPr>
       <p:sp>
         <p:nvSpPr>
-          <p:cNvPr id="3" name="Subtitle 2">
+          <p:cNvPr id="2" name="Title 1"/>
+          <p:cNvSpPr>
+            <a:spLocks noGrp="1"/>
+          </p:cNvSpPr>
+          <p:nvPr>
+            <p:ph type="title"/>
+          </p:nvPr>
+        </p:nvSpPr>
+        <p:spPr/>
+        <p:txBody>
+          <a:bodyPr/>
+          <a:lstStyle/>
+          <a:p>
+            <a:r>
+              <a:rPr lang="en-US" dirty="0"/>
+              <a:t>Front-end</a:t>
+            </a:r>
+            <a:endParaRPr lang="he-IL" dirty="0"/>
+          </a:p>
+        </p:txBody>
+      </p:sp>
+      <p:pic>
+        <p:nvPicPr>
+          <p:cNvPr id="2050" name="Picture 2" descr="C:\Users\Aviel\Desktop\סמסטר ב' - 2019\סדנא בהנדסת תוכנה\פרוייקט\תמונות מסך\plugsMainViewer - LoggedInWithSidebar.jpg"/>
+          <p:cNvPicPr>
+            <a:picLocks noChangeAspect="1" noChangeArrowheads="1"/>
+          </p:cNvPicPr>
+          <p:nvPr/>
+        </p:nvPicPr>
+        <p:blipFill>
+          <a:blip r:embed="rId2">
             <a:extLst>
-              <a:ext uri="{FF2B5EF4-FFF2-40B4-BE49-F238E27FC236}">
-                <a16:creationId xmlns="" xmlns:a16="http://schemas.microsoft.com/office/drawing/2014/main" id="{559A2D5C-2836-4B03-B591-0DE3A438EF87}"/>
+              <a:ext uri="{28A0092B-C50C-407E-A947-70E740481C1C}">
+                <a14:useLocalDpi xmlns:a14="http://schemas.microsoft.com/office/drawing/2010/main" val="0"/>
               </a:ext>
             </a:extLst>
-          </p:cNvPr>
-          <p:cNvSpPr>
-            <a:spLocks noGrp="1"/>
-          </p:cNvSpPr>
-          <p:nvPr>
-            <p:ph type="subTitle" idx="4294967295"/>
-          </p:nvPr>
-        </p:nvSpPr>
-        <p:spPr>
+          </a:blip>
+          <a:srcRect/>
+          <a:stretch>
+            <a:fillRect/>
+          </a:stretch>
+        </p:blipFill>
+        <p:spPr bwMode="auto">
           <a:xfrm>
-            <a:off x="1295400" y="2819400"/>
-            <a:ext cx="6858000" cy="1655762"/>
-          </a:xfrm>
-        </p:spPr>
-        <p:txBody>
-          <a:bodyPr/>
-          <a:lstStyle/>
-          <a:p>
-            <a:r>
-              <a:rPr lang="en-US" dirty="0"/>
-              <a:t>Add New Device, Device Settings and Timing Settings</a:t>
-            </a:r>
-          </a:p>
-        </p:txBody>
-      </p:sp>
-      <p:sp>
-        <p:nvSpPr>
-          <p:cNvPr id="4" name="Title 1"/>
-          <p:cNvSpPr txBox="1">
-            <a:spLocks/>
-          </p:cNvSpPr>
-          <p:nvPr/>
-        </p:nvSpPr>
-        <p:spPr>
-          <a:xfrm>
-            <a:off x="609600" y="381000"/>
-            <a:ext cx="7886700" cy="1325563"/>
+            <a:off x="457200" y="2091871"/>
+            <a:ext cx="8272747" cy="3784600"/>
           </a:xfrm>
           <a:prstGeom prst="rect">
             <a:avLst/>
           </a:prstGeom>
+          <a:noFill/>
+          <a:extLst>
+            <a:ext uri="{909E8E84-426E-40DD-AFC4-6F175D3DCCD1}">
+              <a14:hiddenFill xmlns:a14="http://schemas.microsoft.com/office/drawing/2010/main">
+                <a:solidFill>
+                  <a:srgbClr val="FFFFFF"/>
+                </a:solidFill>
+              </a14:hiddenFill>
+            </a:ext>
+          </a:extLst>
         </p:spPr>
-        <p:txBody>
-          <a:bodyPr vert="horz" lIns="91440" tIns="45720" rIns="91440" bIns="45720" rtlCol="0" anchor="ctr">
-            <a:normAutofit/>
+      </p:pic>
+      <p:sp>
+        <p:nvSpPr>
+          <p:cNvPr id="3" name="TextBox 2"/>
+          <p:cNvSpPr txBox="1"/>
+          <p:nvPr/>
+        </p:nvSpPr>
+        <p:spPr>
+          <a:xfrm>
+            <a:off x="228600" y="1524000"/>
+            <a:ext cx="8763000" cy="369332"/>
+          </a:xfrm>
+          <a:prstGeom prst="rect">
+            <a:avLst/>
+          </a:prstGeom>
+          <a:noFill/>
+        </p:spPr>
+        <p:txBody>
+          <a:bodyPr wrap="square" rtlCol="1">
+            <a:spAutoFit/>
           </a:bodyPr>
-          <a:lstStyle>
-            <a:lvl1pPr algn="ctr" defTabSz="914400" rtl="0" eaLnBrk="1" latinLnBrk="0" hangingPunct="1">
-              <a:lnSpc>
-                <a:spcPct val="90000"/>
-              </a:lnSpc>
-              <a:spcBef>
-                <a:spcPct val="0"/>
-              </a:spcBef>
-              <a:buNone/>
-              <a:defRPr sz="3200" b="0" i="0" kern="1200" cap="all">
-                <a:solidFill>
-                  <a:schemeClr val="accent1"/>
-                </a:solidFill>
-                <a:effectLst/>
-                <a:latin typeface="+mj-lt"/>
-                <a:ea typeface="+mj-ea"/>
-                <a:cs typeface="+mj-cs"/>
-              </a:defRPr>
-            </a:lvl1pPr>
-          </a:lstStyle>
-          <a:p>
-            <a:r>
-              <a:rPr lang="en-US" smtClean="0"/>
-              <a:t>Front-end</a:t>
+          <a:lstStyle/>
+          <a:p>
+            <a:r>
+              <a:rPr lang="en-US" dirty="0" smtClean="0"/>
+              <a:t>Home Page when logging in</a:t>
+            </a:r>
+            <a:endParaRPr lang="he-IL" dirty="0"/>
+          </a:p>
+        </p:txBody>
+      </p:sp>
+      <p:sp>
+        <p:nvSpPr>
+          <p:cNvPr id="4" name="TextBox 3"/>
+          <p:cNvSpPr txBox="1"/>
+          <p:nvPr/>
+        </p:nvSpPr>
+        <p:spPr>
+          <a:xfrm>
+            <a:off x="228600" y="1524000"/>
+            <a:ext cx="8686800" cy="369332"/>
+          </a:xfrm>
+          <a:prstGeom prst="rect">
+            <a:avLst/>
+          </a:prstGeom>
+          <a:noFill/>
+        </p:spPr>
+        <p:txBody>
+          <a:bodyPr wrap="square" rtlCol="1">
+            <a:spAutoFit/>
+          </a:bodyPr>
+          <a:lstStyle/>
+          <a:p>
+            <a:r>
+              <a:rPr lang="en-US" dirty="0" smtClean="0"/>
+              <a:t>Each row matches one specific plug that the client owns and approved</a:t>
             </a:r>
             <a:endParaRPr lang="he-IL" dirty="0"/>
           </a:p>
@@ -8831,7 +8873,7 @@
     </p:spTree>
     <p:extLst>
       <p:ext uri="{BB962C8B-B14F-4D97-AF65-F5344CB8AC3E}">
-        <p14:creationId xmlns:p14="http://schemas.microsoft.com/office/powerpoint/2010/main" val="639668095"/>
+        <p14:creationId xmlns:p14="http://schemas.microsoft.com/office/powerpoint/2010/main" val="997733699"/>
       </p:ext>
     </p:extLst>
   </p:cSld>
@@ -8841,14 +8883,411 @@
   <p:timing>
     <p:tnLst>
       <p:par>
-        <p:cTn id="1" dur="indefinite" restart="never" nodeType="tmRoot"/>
+        <p:cTn id="1" dur="indefinite" restart="never" nodeType="tmRoot">
+          <p:childTnLst>
+            <p:seq concurrent="1" nextAc="seek">
+              <p:cTn id="2" dur="indefinite" nodeType="mainSeq">
+                <p:childTnLst>
+                  <p:par>
+                    <p:cTn id="3" fill="hold">
+                      <p:stCondLst>
+                        <p:cond delay="indefinite"/>
+                      </p:stCondLst>
+                      <p:childTnLst>
+                        <p:par>
+                          <p:cTn id="4" fill="hold">
+                            <p:stCondLst>
+                              <p:cond delay="0"/>
+                            </p:stCondLst>
+                            <p:childTnLst>
+                              <p:par>
+                                <p:cTn id="5" presetID="10" presetClass="entr" presetSubtype="0" fill="hold" grpId="0" nodeType="clickEffect">
+                                  <p:stCondLst>
+                                    <p:cond delay="0"/>
+                                  </p:stCondLst>
+                                  <p:childTnLst>
+                                    <p:set>
+                                      <p:cBhvr>
+                                        <p:cTn id="6" dur="1" fill="hold">
+                                          <p:stCondLst>
+                                            <p:cond delay="0"/>
+                                          </p:stCondLst>
+                                        </p:cTn>
+                                        <p:tgtEl>
+                                          <p:spTgt spid="3"/>
+                                        </p:tgtEl>
+                                        <p:attrNameLst>
+                                          <p:attrName>style.visibility</p:attrName>
+                                        </p:attrNameLst>
+                                      </p:cBhvr>
+                                      <p:to>
+                                        <p:strVal val="visible"/>
+                                      </p:to>
+                                    </p:set>
+                                    <p:animEffect transition="in" filter="fade">
+                                      <p:cBhvr>
+                                        <p:cTn id="7" dur="500"/>
+                                        <p:tgtEl>
+                                          <p:spTgt spid="3"/>
+                                        </p:tgtEl>
+                                      </p:cBhvr>
+                                    </p:animEffect>
+                                  </p:childTnLst>
+                                </p:cTn>
+                              </p:par>
+                            </p:childTnLst>
+                          </p:cTn>
+                        </p:par>
+                      </p:childTnLst>
+                    </p:cTn>
+                  </p:par>
+                  <p:par>
+                    <p:cTn id="8" fill="hold">
+                      <p:stCondLst>
+                        <p:cond delay="indefinite"/>
+                      </p:stCondLst>
+                      <p:childTnLst>
+                        <p:par>
+                          <p:cTn id="9" fill="hold">
+                            <p:stCondLst>
+                              <p:cond delay="0"/>
+                            </p:stCondLst>
+                            <p:childTnLst>
+                              <p:par>
+                                <p:cTn id="10" presetID="10" presetClass="exit" presetSubtype="0" fill="hold" grpId="1" nodeType="clickEffect">
+                                  <p:stCondLst>
+                                    <p:cond delay="0"/>
+                                  </p:stCondLst>
+                                  <p:childTnLst>
+                                    <p:animEffect transition="out" filter="fade">
+                                      <p:cBhvr>
+                                        <p:cTn id="11" dur="500"/>
+                                        <p:tgtEl>
+                                          <p:spTgt spid="3"/>
+                                        </p:tgtEl>
+                                      </p:cBhvr>
+                                    </p:animEffect>
+                                    <p:set>
+                                      <p:cBhvr>
+                                        <p:cTn id="12" dur="1" fill="hold">
+                                          <p:stCondLst>
+                                            <p:cond delay="499"/>
+                                          </p:stCondLst>
+                                        </p:cTn>
+                                        <p:tgtEl>
+                                          <p:spTgt spid="3"/>
+                                        </p:tgtEl>
+                                        <p:attrNameLst>
+                                          <p:attrName>style.visibility</p:attrName>
+                                        </p:attrNameLst>
+                                      </p:cBhvr>
+                                      <p:to>
+                                        <p:strVal val="hidden"/>
+                                      </p:to>
+                                    </p:set>
+                                  </p:childTnLst>
+                                </p:cTn>
+                              </p:par>
+                            </p:childTnLst>
+                          </p:cTn>
+                        </p:par>
+                      </p:childTnLst>
+                    </p:cTn>
+                  </p:par>
+                  <p:par>
+                    <p:cTn id="13" fill="hold">
+                      <p:stCondLst>
+                        <p:cond delay="indefinite"/>
+                      </p:stCondLst>
+                      <p:childTnLst>
+                        <p:par>
+                          <p:cTn id="14" fill="hold">
+                            <p:stCondLst>
+                              <p:cond delay="0"/>
+                            </p:stCondLst>
+                            <p:childTnLst>
+                              <p:par>
+                                <p:cTn id="15" presetID="10" presetClass="entr" presetSubtype="0" fill="hold" grpId="0" nodeType="clickEffect">
+                                  <p:stCondLst>
+                                    <p:cond delay="0"/>
+                                  </p:stCondLst>
+                                  <p:childTnLst>
+                                    <p:set>
+                                      <p:cBhvr>
+                                        <p:cTn id="16" dur="1" fill="hold">
+                                          <p:stCondLst>
+                                            <p:cond delay="0"/>
+                                          </p:stCondLst>
+                                        </p:cTn>
+                                        <p:tgtEl>
+                                          <p:spTgt spid="4"/>
+                                        </p:tgtEl>
+                                        <p:attrNameLst>
+                                          <p:attrName>style.visibility</p:attrName>
+                                        </p:attrNameLst>
+                                      </p:cBhvr>
+                                      <p:to>
+                                        <p:strVal val="visible"/>
+                                      </p:to>
+                                    </p:set>
+                                    <p:animEffect transition="in" filter="fade">
+                                      <p:cBhvr>
+                                        <p:cTn id="17" dur="500"/>
+                                        <p:tgtEl>
+                                          <p:spTgt spid="4"/>
+                                        </p:tgtEl>
+                                      </p:cBhvr>
+                                    </p:animEffect>
+                                  </p:childTnLst>
+                                </p:cTn>
+                              </p:par>
+                            </p:childTnLst>
+                          </p:cTn>
+                        </p:par>
+                      </p:childTnLst>
+                    </p:cTn>
+                  </p:par>
+                </p:childTnLst>
+              </p:cTn>
+              <p:prevCondLst>
+                <p:cond evt="onPrev" delay="0">
+                  <p:tgtEl>
+                    <p:sldTgt/>
+                  </p:tgtEl>
+                </p:cond>
+              </p:prevCondLst>
+              <p:nextCondLst>
+                <p:cond evt="onNext" delay="0">
+                  <p:tgtEl>
+                    <p:sldTgt/>
+                  </p:tgtEl>
+                </p:cond>
+              </p:nextCondLst>
+            </p:seq>
+          </p:childTnLst>
+        </p:cTn>
       </p:par>
     </p:tnLst>
+    <p:bldLst>
+      <p:bldP spid="3" grpId="0"/>
+      <p:bldP spid="3" grpId="1"/>
+      <p:bldP spid="4" grpId="0"/>
+    </p:bldLst>
   </p:timing>
 </p:sld>
 </file>
 
 <file path=ppt/slides/slide15.xml><?xml version="1.0" encoding="utf-8"?>
+<p:sld xmlns:a="http://schemas.openxmlformats.org/drawingml/2006/main" xmlns:r="http://schemas.openxmlformats.org/officeDocument/2006/relationships" xmlns:p="http://schemas.openxmlformats.org/presentationml/2006/main">
+  <p:cSld>
+    <p:spTree>
+      <p:nvGrpSpPr>
+        <p:cNvPr id="1" name=""/>
+        <p:cNvGrpSpPr/>
+        <p:nvPr/>
+      </p:nvGrpSpPr>
+      <p:grpSpPr>
+        <a:xfrm>
+          <a:off x="0" y="0"/>
+          <a:ext cx="0" cy="0"/>
+          <a:chOff x="0" y="0"/>
+          <a:chExt cx="0" cy="0"/>
+        </a:xfrm>
+      </p:grpSpPr>
+      <p:sp>
+        <p:nvSpPr>
+          <p:cNvPr id="2" name="Title 1"/>
+          <p:cNvSpPr>
+            <a:spLocks noGrp="1"/>
+          </p:cNvSpPr>
+          <p:nvPr>
+            <p:ph type="title"/>
+          </p:nvPr>
+        </p:nvSpPr>
+        <p:spPr/>
+        <p:txBody>
+          <a:bodyPr/>
+          <a:lstStyle/>
+          <a:p>
+            <a:r>
+              <a:rPr lang="en-US" dirty="0"/>
+              <a:t>Front-end</a:t>
+            </a:r>
+            <a:endParaRPr lang="he-IL" dirty="0"/>
+          </a:p>
+        </p:txBody>
+      </p:sp>
+      <p:pic>
+        <p:nvPicPr>
+          <p:cNvPr id="3074" name="Picture 2" descr="C:\Users\Aviel\Desktop\סמסטר ב' - 2019\סדנא בהנדסת תוכנה\פרוייקט\תמונות מסך\plugsMainViewerWin - LoggedInWithSidebar.jpg"/>
+          <p:cNvPicPr>
+            <a:picLocks noChangeAspect="1" noChangeArrowheads="1"/>
+          </p:cNvPicPr>
+          <p:nvPr/>
+        </p:nvPicPr>
+        <p:blipFill>
+          <a:blip r:embed="rId2">
+            <a:extLst>
+              <a:ext uri="{28A0092B-C50C-407E-A947-70E740481C1C}">
+                <a14:useLocalDpi xmlns:a14="http://schemas.microsoft.com/office/drawing/2010/main" val="0"/>
+              </a:ext>
+            </a:extLst>
+          </a:blip>
+          <a:srcRect/>
+          <a:stretch>
+            <a:fillRect/>
+          </a:stretch>
+        </p:blipFill>
+        <p:spPr bwMode="auto">
+          <a:xfrm>
+            <a:off x="457200" y="1981201"/>
+            <a:ext cx="8348041" cy="3819046"/>
+          </a:xfrm>
+          <a:prstGeom prst="rect">
+            <a:avLst/>
+          </a:prstGeom>
+          <a:noFill/>
+          <a:extLst>
+            <a:ext uri="{909E8E84-426E-40DD-AFC4-6F175D3DCCD1}">
+              <a14:hiddenFill xmlns:a14="http://schemas.microsoft.com/office/drawing/2010/main">
+                <a:solidFill>
+                  <a:srgbClr val="FFFFFF"/>
+                </a:solidFill>
+              </a14:hiddenFill>
+            </a:ext>
+          </a:extLst>
+        </p:spPr>
+      </p:pic>
+      <p:sp>
+        <p:nvSpPr>
+          <p:cNvPr id="5" name="TextBox 4"/>
+          <p:cNvSpPr txBox="1"/>
+          <p:nvPr/>
+        </p:nvSpPr>
+        <p:spPr>
+          <a:xfrm>
+            <a:off x="228600" y="1447800"/>
+            <a:ext cx="8763000" cy="369332"/>
+          </a:xfrm>
+          <a:prstGeom prst="rect">
+            <a:avLst/>
+          </a:prstGeom>
+          <a:noFill/>
+        </p:spPr>
+        <p:txBody>
+          <a:bodyPr wrap="square" rtlCol="1">
+            <a:spAutoFit/>
+          </a:bodyPr>
+          <a:lstStyle/>
+          <a:p>
+            <a:r>
+              <a:rPr lang="en-US" dirty="0" smtClean="0"/>
+              <a:t>The 3 buttons menu…</a:t>
+            </a:r>
+            <a:endParaRPr lang="he-IL" dirty="0"/>
+          </a:p>
+        </p:txBody>
+      </p:sp>
+    </p:spTree>
+    <p:extLst>
+      <p:ext uri="{BB962C8B-B14F-4D97-AF65-F5344CB8AC3E}">
+        <p14:creationId xmlns:p14="http://schemas.microsoft.com/office/powerpoint/2010/main" val="3740970408"/>
+      </p:ext>
+    </p:extLst>
+  </p:cSld>
+  <p:clrMapOvr>
+    <a:masterClrMapping/>
+  </p:clrMapOvr>
+  <p:timing>
+    <p:tnLst>
+      <p:par>
+        <p:cTn id="1" dur="indefinite" restart="never" nodeType="tmRoot">
+          <p:childTnLst>
+            <p:seq concurrent="1" nextAc="seek">
+              <p:cTn id="2" dur="indefinite" nodeType="mainSeq">
+                <p:childTnLst>
+                  <p:par>
+                    <p:cTn id="3" fill="hold">
+                      <p:stCondLst>
+                        <p:cond delay="indefinite"/>
+                      </p:stCondLst>
+                      <p:childTnLst>
+                        <p:par>
+                          <p:cTn id="4" fill="hold">
+                            <p:stCondLst>
+                              <p:cond delay="0"/>
+                            </p:stCondLst>
+                            <p:childTnLst>
+                              <p:par>
+                                <p:cTn id="5" presetID="10" presetClass="entr" presetSubtype="0" fill="hold" grpId="0" nodeType="clickEffect">
+                                  <p:stCondLst>
+                                    <p:cond delay="0"/>
+                                  </p:stCondLst>
+                                  <p:childTnLst>
+                                    <p:set>
+                                      <p:cBhvr>
+                                        <p:cTn id="6" dur="1" fill="hold">
+                                          <p:stCondLst>
+                                            <p:cond delay="0"/>
+                                          </p:stCondLst>
+                                        </p:cTn>
+                                        <p:tgtEl>
+                                          <p:spTgt spid="5"/>
+                                        </p:tgtEl>
+                                        <p:attrNameLst>
+                                          <p:attrName>style.visibility</p:attrName>
+                                        </p:attrNameLst>
+                                      </p:cBhvr>
+                                      <p:to>
+                                        <p:strVal val="visible"/>
+                                      </p:to>
+                                    </p:set>
+                                    <p:animEffect transition="in" filter="fade">
+                                      <p:cBhvr>
+                                        <p:cTn id="7" dur="500"/>
+                                        <p:tgtEl>
+                                          <p:spTgt spid="5"/>
+                                        </p:tgtEl>
+                                      </p:cBhvr>
+                                    </p:animEffect>
+                                  </p:childTnLst>
+                                </p:cTn>
+                              </p:par>
+                            </p:childTnLst>
+                          </p:cTn>
+                        </p:par>
+                      </p:childTnLst>
+                    </p:cTn>
+                  </p:par>
+                </p:childTnLst>
+              </p:cTn>
+              <p:prevCondLst>
+                <p:cond evt="onPrev" delay="0">
+                  <p:tgtEl>
+                    <p:sldTgt/>
+                  </p:tgtEl>
+                </p:cond>
+              </p:prevCondLst>
+              <p:nextCondLst>
+                <p:cond evt="onNext" delay="0">
+                  <p:tgtEl>
+                    <p:sldTgt/>
+                  </p:tgtEl>
+                </p:cond>
+              </p:nextCondLst>
+            </p:seq>
+          </p:childTnLst>
+        </p:cTn>
+      </p:par>
+    </p:tnLst>
+    <p:bldLst>
+      <p:bldP spid="5" grpId="0"/>
+    </p:bldLst>
+  </p:timing>
+</p:sld>
+</file>
+
+<file path=ppt/slides/slide16.xml><?xml version="1.0" encoding="utf-8"?>
 <p:sld xmlns:a="http://schemas.openxmlformats.org/drawingml/2006/main" xmlns:r="http://schemas.openxmlformats.org/officeDocument/2006/relationships" xmlns:p="http://schemas.openxmlformats.org/presentationml/2006/main">
   <p:cSld>
     <p:spTree>
@@ -9231,410 +9670,6 @@
     <p:extLst>
       <p:ext uri="{BB962C8B-B14F-4D97-AF65-F5344CB8AC3E}">
         <p14:creationId xmlns:p14="http://schemas.microsoft.com/office/powerpoint/2010/main" val="1170275463"/>
-      </p:ext>
-    </p:extLst>
-  </p:cSld>
-  <p:clrMapOvr>
-    <a:masterClrMapping/>
-  </p:clrMapOvr>
-  <p:timing>
-    <p:tnLst>
-      <p:par>
-        <p:cTn id="1" dur="indefinite" restart="never" nodeType="tmRoot"/>
-      </p:par>
-    </p:tnLst>
-  </p:timing>
-</p:sld>
-</file>
-
-<file path=ppt/slides/slide16.xml><?xml version="1.0" encoding="utf-8"?>
-<p:sld xmlns:a="http://schemas.openxmlformats.org/drawingml/2006/main" xmlns:r="http://schemas.openxmlformats.org/officeDocument/2006/relationships" xmlns:p="http://schemas.openxmlformats.org/presentationml/2006/main">
-  <p:cSld>
-    <p:spTree>
-      <p:nvGrpSpPr>
-        <p:cNvPr id="1" name=""/>
-        <p:cNvGrpSpPr/>
-        <p:nvPr/>
-      </p:nvGrpSpPr>
-      <p:grpSpPr>
-        <a:xfrm>
-          <a:off x="0" y="0"/>
-          <a:ext cx="0" cy="0"/>
-          <a:chOff x="0" y="0"/>
-          <a:chExt cx="0" cy="0"/>
-        </a:xfrm>
-      </p:grpSpPr>
-      <p:pic>
-        <p:nvPicPr>
-          <p:cNvPr id="15" name="Content Placeholder 10" descr="C:\Users\Aviel\Desktop\סמסטר ב' - 2019\סדנא בהנדסת תוכנה\פרוייקט\תמונות מסך\addNewDeviceWin - LoggedInWithSidebar.jpg">
-            <a:extLst>
-              <a:ext uri="{FF2B5EF4-FFF2-40B4-BE49-F238E27FC236}">
-                <a16:creationId xmlns="" xmlns:a16="http://schemas.microsoft.com/office/drawing/2014/main" id="{C2359224-90A0-4E34-8042-FD8FB786FD20}"/>
-              </a:ext>
-            </a:extLst>
-          </p:cNvPr>
-          <p:cNvPicPr>
-            <a:picLocks noGrp="1"/>
-          </p:cNvPicPr>
-          <p:nvPr>
-            <p:ph idx="4294967295"/>
-          </p:nvPr>
-        </p:nvPicPr>
-        <p:blipFill rotWithShape="1">
-          <a:blip r:embed="rId2" cstate="print">
-            <a:extLst>
-              <a:ext uri="{28A0092B-C50C-407E-A947-70E740481C1C}">
-                <a14:useLocalDpi xmlns:a14="http://schemas.microsoft.com/office/drawing/2010/main" val="0"/>
-              </a:ext>
-            </a:extLst>
-          </a:blip>
-          <a:srcRect r="50009"/>
-          <a:stretch/>
-        </p:blipFill>
-        <p:spPr bwMode="auto">
-          <a:xfrm>
-            <a:off x="533400" y="1676400"/>
-            <a:ext cx="3276000" cy="3997325"/>
-          </a:xfrm>
-          <a:prstGeom prst="rect">
-            <a:avLst/>
-          </a:prstGeom>
-          <a:noFill/>
-        </p:spPr>
-      </p:pic>
-      <p:sp>
-        <p:nvSpPr>
-          <p:cNvPr id="6" name="Title 1"/>
-          <p:cNvSpPr txBox="1">
-            <a:spLocks/>
-          </p:cNvSpPr>
-          <p:nvPr/>
-        </p:nvSpPr>
-        <p:spPr>
-          <a:xfrm>
-            <a:off x="609600" y="381000"/>
-            <a:ext cx="7886700" cy="1325563"/>
-          </a:xfrm>
-          <a:prstGeom prst="rect">
-            <a:avLst/>
-          </a:prstGeom>
-        </p:spPr>
-        <p:txBody>
-          <a:bodyPr vert="horz" lIns="91440" tIns="45720" rIns="91440" bIns="45720" rtlCol="0" anchor="ctr">
-            <a:normAutofit/>
-          </a:bodyPr>
-          <a:lstStyle>
-            <a:lvl1pPr algn="ctr" defTabSz="914400" rtl="0" eaLnBrk="1" latinLnBrk="0" hangingPunct="1">
-              <a:lnSpc>
-                <a:spcPct val="90000"/>
-              </a:lnSpc>
-              <a:spcBef>
-                <a:spcPct val="0"/>
-              </a:spcBef>
-              <a:buNone/>
-              <a:defRPr sz="3200" b="0" i="0" kern="1200" cap="all">
-                <a:solidFill>
-                  <a:schemeClr val="accent1"/>
-                </a:solidFill>
-                <a:effectLst/>
-                <a:latin typeface="+mj-lt"/>
-                <a:ea typeface="+mj-ea"/>
-                <a:cs typeface="+mj-cs"/>
-              </a:defRPr>
-            </a:lvl1pPr>
-          </a:lstStyle>
-          <a:p>
-            <a:r>
-              <a:rPr lang="en-US" smtClean="0"/>
-              <a:t>Add new device</a:t>
-            </a:r>
-            <a:endParaRPr lang="he-IL" dirty="0"/>
-          </a:p>
-        </p:txBody>
-      </p:sp>
-      <p:sp>
-        <p:nvSpPr>
-          <p:cNvPr id="4" name="Content Placeholder 3">
-            <a:extLst>
-              <a:ext uri="{FF2B5EF4-FFF2-40B4-BE49-F238E27FC236}">
-                <a16:creationId xmlns="" xmlns:a16="http://schemas.microsoft.com/office/drawing/2014/main" id="{1367783C-5032-4F97-BB0B-E92FF3AB3579}"/>
-              </a:ext>
-            </a:extLst>
-          </p:cNvPr>
-          <p:cNvSpPr txBox="1">
-            <a:spLocks/>
-          </p:cNvSpPr>
-          <p:nvPr/>
-        </p:nvSpPr>
-        <p:spPr>
-          <a:xfrm>
-            <a:off x="4038600" y="1371600"/>
-            <a:ext cx="4838700" cy="4351338"/>
-          </a:xfrm>
-          <a:prstGeom prst="rect">
-            <a:avLst/>
-          </a:prstGeom>
-        </p:spPr>
-        <p:txBody>
-          <a:bodyPr vert="horz" lIns="91440" tIns="45720" rIns="91440" bIns="45720" rtlCol="0">
-            <a:normAutofit fontScale="77500" lnSpcReduction="20000"/>
-          </a:bodyPr>
-          <a:lstStyle>
-            <a:lvl1pPr marL="228600" indent="-228600" algn="l" defTabSz="914400" rtl="0" eaLnBrk="1" latinLnBrk="0" hangingPunct="1">
-              <a:lnSpc>
-                <a:spcPct val="120000"/>
-              </a:lnSpc>
-              <a:spcBef>
-                <a:spcPts val="1000"/>
-              </a:spcBef>
-              <a:buClr>
-                <a:schemeClr val="accent1"/>
-              </a:buClr>
-              <a:buSzPct val="100000"/>
-              <a:buFont typeface="Arial" panose="020B0604020202020204" pitchFamily="34" charset="0"/>
-              <a:buChar char="•"/>
-              <a:defRPr sz="2000" kern="1200">
-                <a:solidFill>
-                  <a:schemeClr val="tx1"/>
-                </a:solidFill>
-                <a:effectLst/>
-                <a:latin typeface="+mn-lt"/>
-                <a:ea typeface="+mn-ea"/>
-                <a:cs typeface="+mn-cs"/>
-              </a:defRPr>
-            </a:lvl1pPr>
-            <a:lvl2pPr marL="685800" indent="-228600" algn="l" defTabSz="914400" rtl="0" eaLnBrk="1" latinLnBrk="0" hangingPunct="1">
-              <a:lnSpc>
-                <a:spcPct val="120000"/>
-              </a:lnSpc>
-              <a:spcBef>
-                <a:spcPts val="500"/>
-              </a:spcBef>
-              <a:buClr>
-                <a:schemeClr val="accent1"/>
-              </a:buClr>
-              <a:buSzPct val="100000"/>
-              <a:buFont typeface="Arial" panose="020B0604020202020204" pitchFamily="34" charset="0"/>
-              <a:buChar char="•"/>
-              <a:defRPr sz="1800" kern="1200" cap="none" baseline="0">
-                <a:solidFill>
-                  <a:schemeClr val="tx1"/>
-                </a:solidFill>
-                <a:effectLst/>
-                <a:latin typeface="+mn-lt"/>
-                <a:ea typeface="+mn-ea"/>
-                <a:cs typeface="+mn-cs"/>
-              </a:defRPr>
-            </a:lvl2pPr>
-            <a:lvl3pPr marL="1143000" indent="-228600" algn="l" defTabSz="914400" rtl="0" eaLnBrk="1" latinLnBrk="0" hangingPunct="1">
-              <a:lnSpc>
-                <a:spcPct val="120000"/>
-              </a:lnSpc>
-              <a:spcBef>
-                <a:spcPts val="500"/>
-              </a:spcBef>
-              <a:buClr>
-                <a:schemeClr val="accent1"/>
-              </a:buClr>
-              <a:buSzPct val="100000"/>
-              <a:buFont typeface="Arial" panose="020B0604020202020204" pitchFamily="34" charset="0"/>
-              <a:buChar char="•"/>
-              <a:defRPr sz="1600" kern="1200">
-                <a:solidFill>
-                  <a:schemeClr val="tx1"/>
-                </a:solidFill>
-                <a:effectLst/>
-                <a:latin typeface="+mn-lt"/>
-                <a:ea typeface="+mn-ea"/>
-                <a:cs typeface="+mn-cs"/>
-              </a:defRPr>
-            </a:lvl3pPr>
-            <a:lvl4pPr marL="1600200" indent="-228600" algn="l" defTabSz="914400" rtl="0" eaLnBrk="1" latinLnBrk="0" hangingPunct="1">
-              <a:lnSpc>
-                <a:spcPct val="120000"/>
-              </a:lnSpc>
-              <a:spcBef>
-                <a:spcPts val="500"/>
-              </a:spcBef>
-              <a:buClr>
-                <a:schemeClr val="accent1"/>
-              </a:buClr>
-              <a:buSzPct val="100000"/>
-              <a:buFont typeface="Arial" panose="020B0604020202020204" pitchFamily="34" charset="0"/>
-              <a:buChar char="•"/>
-              <a:defRPr sz="1400" kern="1200" cap="none" baseline="0">
-                <a:solidFill>
-                  <a:schemeClr val="tx1"/>
-                </a:solidFill>
-                <a:effectLst/>
-                <a:latin typeface="+mn-lt"/>
-                <a:ea typeface="+mn-ea"/>
-                <a:cs typeface="+mn-cs"/>
-              </a:defRPr>
-            </a:lvl4pPr>
-            <a:lvl5pPr marL="2057400" indent="-228600" algn="l" defTabSz="914400" rtl="0" eaLnBrk="1" latinLnBrk="0" hangingPunct="1">
-              <a:lnSpc>
-                <a:spcPct val="120000"/>
-              </a:lnSpc>
-              <a:spcBef>
-                <a:spcPts val="500"/>
-              </a:spcBef>
-              <a:buClr>
-                <a:schemeClr val="accent1"/>
-              </a:buClr>
-              <a:buSzPct val="100000"/>
-              <a:buFont typeface="Arial" panose="020B0604020202020204" pitchFamily="34" charset="0"/>
-              <a:buChar char="•"/>
-              <a:defRPr sz="1200" kern="1200">
-                <a:solidFill>
-                  <a:schemeClr val="tx1"/>
-                </a:solidFill>
-                <a:effectLst/>
-                <a:latin typeface="+mn-lt"/>
-                <a:ea typeface="+mn-ea"/>
-                <a:cs typeface="+mn-cs"/>
-              </a:defRPr>
-            </a:lvl5pPr>
-            <a:lvl6pPr marL="2514600" indent="-228600" algn="l" defTabSz="914400" rtl="0" eaLnBrk="1" latinLnBrk="0" hangingPunct="1">
-              <a:lnSpc>
-                <a:spcPct val="120000"/>
-              </a:lnSpc>
-              <a:spcBef>
-                <a:spcPts val="500"/>
-              </a:spcBef>
-              <a:buClr>
-                <a:schemeClr val="accent1"/>
-              </a:buClr>
-              <a:buSzPct val="100000"/>
-              <a:buFont typeface="Arial" panose="020B0604020202020204" pitchFamily="34" charset="0"/>
-              <a:buChar char="•"/>
-              <a:defRPr sz="1200" kern="1200">
-                <a:solidFill>
-                  <a:schemeClr val="tx1"/>
-                </a:solidFill>
-                <a:effectLst/>
-                <a:latin typeface="+mn-lt"/>
-                <a:ea typeface="+mn-ea"/>
-                <a:cs typeface="+mn-cs"/>
-              </a:defRPr>
-            </a:lvl6pPr>
-            <a:lvl7pPr marL="2971800" indent="-228600" algn="l" defTabSz="914400" rtl="0" eaLnBrk="1" latinLnBrk="0" hangingPunct="1">
-              <a:lnSpc>
-                <a:spcPct val="120000"/>
-              </a:lnSpc>
-              <a:spcBef>
-                <a:spcPts val="500"/>
-              </a:spcBef>
-              <a:buClr>
-                <a:schemeClr val="accent1"/>
-              </a:buClr>
-              <a:buSzPct val="100000"/>
-              <a:buFont typeface="Arial" panose="020B0604020202020204" pitchFamily="34" charset="0"/>
-              <a:buChar char="•"/>
-              <a:defRPr sz="1200" kern="1200">
-                <a:solidFill>
-                  <a:schemeClr val="tx1"/>
-                </a:solidFill>
-                <a:effectLst/>
-                <a:latin typeface="+mn-lt"/>
-                <a:ea typeface="+mn-ea"/>
-                <a:cs typeface="+mn-cs"/>
-              </a:defRPr>
-            </a:lvl7pPr>
-            <a:lvl8pPr marL="3429000" indent="-228600" algn="l" defTabSz="914400" rtl="0" eaLnBrk="1" latinLnBrk="0" hangingPunct="1">
-              <a:lnSpc>
-                <a:spcPct val="120000"/>
-              </a:lnSpc>
-              <a:spcBef>
-                <a:spcPts val="500"/>
-              </a:spcBef>
-              <a:buClr>
-                <a:schemeClr val="accent1"/>
-              </a:buClr>
-              <a:buSzPct val="100000"/>
-              <a:buFont typeface="Arial" panose="020B0604020202020204" pitchFamily="34" charset="0"/>
-              <a:buChar char="•"/>
-              <a:defRPr sz="1200" kern="1200" baseline="0">
-                <a:solidFill>
-                  <a:schemeClr val="tx1"/>
-                </a:solidFill>
-                <a:effectLst/>
-                <a:latin typeface="+mn-lt"/>
-                <a:ea typeface="+mn-ea"/>
-                <a:cs typeface="+mn-cs"/>
-              </a:defRPr>
-            </a:lvl8pPr>
-            <a:lvl9pPr marL="3886200" indent="-228600" algn="l" defTabSz="914400" rtl="0" eaLnBrk="1" latinLnBrk="0" hangingPunct="1">
-              <a:lnSpc>
-                <a:spcPct val="120000"/>
-              </a:lnSpc>
-              <a:spcBef>
-                <a:spcPts val="500"/>
-              </a:spcBef>
-              <a:buClr>
-                <a:schemeClr val="accent1"/>
-              </a:buClr>
-              <a:buSzPct val="100000"/>
-              <a:buFont typeface="Arial" panose="020B0604020202020204" pitchFamily="34" charset="0"/>
-              <a:buChar char="•"/>
-              <a:defRPr sz="1200" kern="1200" baseline="0">
-                <a:solidFill>
-                  <a:schemeClr val="tx1"/>
-                </a:solidFill>
-                <a:effectLst/>
-                <a:latin typeface="+mn-lt"/>
-                <a:ea typeface="+mn-ea"/>
-                <a:cs typeface="+mn-cs"/>
-              </a:defRPr>
-            </a:lvl9pPr>
-          </a:lstStyle>
-          <a:p>
-            <a:pPr marL="0" indent="0">
-              <a:buFont typeface="Arial" panose="020B0604020202020204" pitchFamily="34" charset="0"/>
-              <a:buNone/>
-            </a:pPr>
-            <a:endParaRPr lang="en-US" dirty="0" smtClean="0"/>
-          </a:p>
-          <a:p>
-            <a:pPr marL="0" indent="0">
-              <a:buFont typeface="Arial" panose="020B0604020202020204" pitchFamily="34" charset="0"/>
-              <a:buNone/>
-            </a:pPr>
-            <a:r>
-              <a:rPr lang="en-US" dirty="0" smtClean="0"/>
-              <a:t>Page elements and functionalities:</a:t>
-            </a:r>
-          </a:p>
-          <a:p>
-            <a:r>
-              <a:rPr lang="en-US" dirty="0" smtClean="0"/>
-              <a:t>Present a popup by choosing a certain unapproved plug, by clicking the “accept” button</a:t>
-            </a:r>
-          </a:p>
-          <a:p>
-            <a:r>
-              <a:rPr lang="en-US" dirty="0" smtClean="0"/>
-              <a:t>Using said popup, the client determines the settings of the chosen plug</a:t>
-            </a:r>
-          </a:p>
-          <a:p>
-            <a:r>
-              <a:rPr lang="en-US" dirty="0" smtClean="0"/>
-              <a:t>Conveying the client’s  choices to the database and updating the page accordingly by clicking the “next” button from the popup</a:t>
-            </a:r>
-          </a:p>
-          <a:p>
-            <a:r>
-              <a:rPr lang="en-US" dirty="0" smtClean="0"/>
-              <a:t>Removing the popup by clicking on the “cancel” button ,which is located on said popup</a:t>
-            </a:r>
-          </a:p>
-        </p:txBody>
-      </p:sp>
-    </p:spTree>
-    <p:extLst>
-      <p:ext uri="{BB962C8B-B14F-4D97-AF65-F5344CB8AC3E}">
-        <p14:creationId xmlns:p14="http://schemas.microsoft.com/office/powerpoint/2010/main" val="3843954407"/>
       </p:ext>
     </p:extLst>
   </p:cSld>
@@ -9670,6 +9705,410 @@
       </p:grpSpPr>
       <p:pic>
         <p:nvPicPr>
+          <p:cNvPr id="15" name="Content Placeholder 10" descr="C:\Users\Aviel\Desktop\סמסטר ב' - 2019\סדנא בהנדסת תוכנה\פרוייקט\תמונות מסך\addNewDeviceWin - LoggedInWithSidebar.jpg">
+            <a:extLst>
+              <a:ext uri="{FF2B5EF4-FFF2-40B4-BE49-F238E27FC236}">
+                <a16:creationId xmlns="" xmlns:a16="http://schemas.microsoft.com/office/drawing/2014/main" id="{C2359224-90A0-4E34-8042-FD8FB786FD20}"/>
+              </a:ext>
+            </a:extLst>
+          </p:cNvPr>
+          <p:cNvPicPr>
+            <a:picLocks noGrp="1"/>
+          </p:cNvPicPr>
+          <p:nvPr>
+            <p:ph idx="4294967295"/>
+          </p:nvPr>
+        </p:nvPicPr>
+        <p:blipFill rotWithShape="1">
+          <a:blip r:embed="rId2" cstate="print">
+            <a:extLst>
+              <a:ext uri="{28A0092B-C50C-407E-A947-70E740481C1C}">
+                <a14:useLocalDpi xmlns:a14="http://schemas.microsoft.com/office/drawing/2010/main" val="0"/>
+              </a:ext>
+            </a:extLst>
+          </a:blip>
+          <a:srcRect r="50009"/>
+          <a:stretch/>
+        </p:blipFill>
+        <p:spPr bwMode="auto">
+          <a:xfrm>
+            <a:off x="533400" y="1676400"/>
+            <a:ext cx="3276000" cy="3997325"/>
+          </a:xfrm>
+          <a:prstGeom prst="rect">
+            <a:avLst/>
+          </a:prstGeom>
+          <a:noFill/>
+        </p:spPr>
+      </p:pic>
+      <p:sp>
+        <p:nvSpPr>
+          <p:cNvPr id="6" name="Title 1"/>
+          <p:cNvSpPr txBox="1">
+            <a:spLocks/>
+          </p:cNvSpPr>
+          <p:nvPr/>
+        </p:nvSpPr>
+        <p:spPr>
+          <a:xfrm>
+            <a:off x="609600" y="381000"/>
+            <a:ext cx="7886700" cy="1325563"/>
+          </a:xfrm>
+          <a:prstGeom prst="rect">
+            <a:avLst/>
+          </a:prstGeom>
+        </p:spPr>
+        <p:txBody>
+          <a:bodyPr vert="horz" lIns="91440" tIns="45720" rIns="91440" bIns="45720" rtlCol="0" anchor="ctr">
+            <a:normAutofit/>
+          </a:bodyPr>
+          <a:lstStyle>
+            <a:lvl1pPr algn="ctr" defTabSz="914400" rtl="0" eaLnBrk="1" latinLnBrk="0" hangingPunct="1">
+              <a:lnSpc>
+                <a:spcPct val="90000"/>
+              </a:lnSpc>
+              <a:spcBef>
+                <a:spcPct val="0"/>
+              </a:spcBef>
+              <a:buNone/>
+              <a:defRPr sz="3200" b="0" i="0" kern="1200" cap="all">
+                <a:solidFill>
+                  <a:schemeClr val="accent1"/>
+                </a:solidFill>
+                <a:effectLst/>
+                <a:latin typeface="+mj-lt"/>
+                <a:ea typeface="+mj-ea"/>
+                <a:cs typeface="+mj-cs"/>
+              </a:defRPr>
+            </a:lvl1pPr>
+          </a:lstStyle>
+          <a:p>
+            <a:r>
+              <a:rPr lang="en-US" smtClean="0"/>
+              <a:t>Add new device</a:t>
+            </a:r>
+            <a:endParaRPr lang="he-IL" dirty="0"/>
+          </a:p>
+        </p:txBody>
+      </p:sp>
+      <p:sp>
+        <p:nvSpPr>
+          <p:cNvPr id="4" name="Content Placeholder 3">
+            <a:extLst>
+              <a:ext uri="{FF2B5EF4-FFF2-40B4-BE49-F238E27FC236}">
+                <a16:creationId xmlns="" xmlns:a16="http://schemas.microsoft.com/office/drawing/2014/main" id="{1367783C-5032-4F97-BB0B-E92FF3AB3579}"/>
+              </a:ext>
+            </a:extLst>
+          </p:cNvPr>
+          <p:cNvSpPr txBox="1">
+            <a:spLocks/>
+          </p:cNvSpPr>
+          <p:nvPr/>
+        </p:nvSpPr>
+        <p:spPr>
+          <a:xfrm>
+            <a:off x="4038600" y="1371600"/>
+            <a:ext cx="4838700" cy="4351338"/>
+          </a:xfrm>
+          <a:prstGeom prst="rect">
+            <a:avLst/>
+          </a:prstGeom>
+        </p:spPr>
+        <p:txBody>
+          <a:bodyPr vert="horz" lIns="91440" tIns="45720" rIns="91440" bIns="45720" rtlCol="0">
+            <a:normAutofit fontScale="77500" lnSpcReduction="20000"/>
+          </a:bodyPr>
+          <a:lstStyle>
+            <a:lvl1pPr marL="228600" indent="-228600" algn="l" defTabSz="914400" rtl="0" eaLnBrk="1" latinLnBrk="0" hangingPunct="1">
+              <a:lnSpc>
+                <a:spcPct val="120000"/>
+              </a:lnSpc>
+              <a:spcBef>
+                <a:spcPts val="1000"/>
+              </a:spcBef>
+              <a:buClr>
+                <a:schemeClr val="accent1"/>
+              </a:buClr>
+              <a:buSzPct val="100000"/>
+              <a:buFont typeface="Arial" panose="020B0604020202020204" pitchFamily="34" charset="0"/>
+              <a:buChar char="•"/>
+              <a:defRPr sz="2000" kern="1200">
+                <a:solidFill>
+                  <a:schemeClr val="tx1"/>
+                </a:solidFill>
+                <a:effectLst/>
+                <a:latin typeface="+mn-lt"/>
+                <a:ea typeface="+mn-ea"/>
+                <a:cs typeface="+mn-cs"/>
+              </a:defRPr>
+            </a:lvl1pPr>
+            <a:lvl2pPr marL="685800" indent="-228600" algn="l" defTabSz="914400" rtl="0" eaLnBrk="1" latinLnBrk="0" hangingPunct="1">
+              <a:lnSpc>
+                <a:spcPct val="120000"/>
+              </a:lnSpc>
+              <a:spcBef>
+                <a:spcPts val="500"/>
+              </a:spcBef>
+              <a:buClr>
+                <a:schemeClr val="accent1"/>
+              </a:buClr>
+              <a:buSzPct val="100000"/>
+              <a:buFont typeface="Arial" panose="020B0604020202020204" pitchFamily="34" charset="0"/>
+              <a:buChar char="•"/>
+              <a:defRPr sz="1800" kern="1200" cap="none" baseline="0">
+                <a:solidFill>
+                  <a:schemeClr val="tx1"/>
+                </a:solidFill>
+                <a:effectLst/>
+                <a:latin typeface="+mn-lt"/>
+                <a:ea typeface="+mn-ea"/>
+                <a:cs typeface="+mn-cs"/>
+              </a:defRPr>
+            </a:lvl2pPr>
+            <a:lvl3pPr marL="1143000" indent="-228600" algn="l" defTabSz="914400" rtl="0" eaLnBrk="1" latinLnBrk="0" hangingPunct="1">
+              <a:lnSpc>
+                <a:spcPct val="120000"/>
+              </a:lnSpc>
+              <a:spcBef>
+                <a:spcPts val="500"/>
+              </a:spcBef>
+              <a:buClr>
+                <a:schemeClr val="accent1"/>
+              </a:buClr>
+              <a:buSzPct val="100000"/>
+              <a:buFont typeface="Arial" panose="020B0604020202020204" pitchFamily="34" charset="0"/>
+              <a:buChar char="•"/>
+              <a:defRPr sz="1600" kern="1200">
+                <a:solidFill>
+                  <a:schemeClr val="tx1"/>
+                </a:solidFill>
+                <a:effectLst/>
+                <a:latin typeface="+mn-lt"/>
+                <a:ea typeface="+mn-ea"/>
+                <a:cs typeface="+mn-cs"/>
+              </a:defRPr>
+            </a:lvl3pPr>
+            <a:lvl4pPr marL="1600200" indent="-228600" algn="l" defTabSz="914400" rtl="0" eaLnBrk="1" latinLnBrk="0" hangingPunct="1">
+              <a:lnSpc>
+                <a:spcPct val="120000"/>
+              </a:lnSpc>
+              <a:spcBef>
+                <a:spcPts val="500"/>
+              </a:spcBef>
+              <a:buClr>
+                <a:schemeClr val="accent1"/>
+              </a:buClr>
+              <a:buSzPct val="100000"/>
+              <a:buFont typeface="Arial" panose="020B0604020202020204" pitchFamily="34" charset="0"/>
+              <a:buChar char="•"/>
+              <a:defRPr sz="1400" kern="1200" cap="none" baseline="0">
+                <a:solidFill>
+                  <a:schemeClr val="tx1"/>
+                </a:solidFill>
+                <a:effectLst/>
+                <a:latin typeface="+mn-lt"/>
+                <a:ea typeface="+mn-ea"/>
+                <a:cs typeface="+mn-cs"/>
+              </a:defRPr>
+            </a:lvl4pPr>
+            <a:lvl5pPr marL="2057400" indent="-228600" algn="l" defTabSz="914400" rtl="0" eaLnBrk="1" latinLnBrk="0" hangingPunct="1">
+              <a:lnSpc>
+                <a:spcPct val="120000"/>
+              </a:lnSpc>
+              <a:spcBef>
+                <a:spcPts val="500"/>
+              </a:spcBef>
+              <a:buClr>
+                <a:schemeClr val="accent1"/>
+              </a:buClr>
+              <a:buSzPct val="100000"/>
+              <a:buFont typeface="Arial" panose="020B0604020202020204" pitchFamily="34" charset="0"/>
+              <a:buChar char="•"/>
+              <a:defRPr sz="1200" kern="1200">
+                <a:solidFill>
+                  <a:schemeClr val="tx1"/>
+                </a:solidFill>
+                <a:effectLst/>
+                <a:latin typeface="+mn-lt"/>
+                <a:ea typeface="+mn-ea"/>
+                <a:cs typeface="+mn-cs"/>
+              </a:defRPr>
+            </a:lvl5pPr>
+            <a:lvl6pPr marL="2514600" indent="-228600" algn="l" defTabSz="914400" rtl="0" eaLnBrk="1" latinLnBrk="0" hangingPunct="1">
+              <a:lnSpc>
+                <a:spcPct val="120000"/>
+              </a:lnSpc>
+              <a:spcBef>
+                <a:spcPts val="500"/>
+              </a:spcBef>
+              <a:buClr>
+                <a:schemeClr val="accent1"/>
+              </a:buClr>
+              <a:buSzPct val="100000"/>
+              <a:buFont typeface="Arial" panose="020B0604020202020204" pitchFamily="34" charset="0"/>
+              <a:buChar char="•"/>
+              <a:defRPr sz="1200" kern="1200">
+                <a:solidFill>
+                  <a:schemeClr val="tx1"/>
+                </a:solidFill>
+                <a:effectLst/>
+                <a:latin typeface="+mn-lt"/>
+                <a:ea typeface="+mn-ea"/>
+                <a:cs typeface="+mn-cs"/>
+              </a:defRPr>
+            </a:lvl6pPr>
+            <a:lvl7pPr marL="2971800" indent="-228600" algn="l" defTabSz="914400" rtl="0" eaLnBrk="1" latinLnBrk="0" hangingPunct="1">
+              <a:lnSpc>
+                <a:spcPct val="120000"/>
+              </a:lnSpc>
+              <a:spcBef>
+                <a:spcPts val="500"/>
+              </a:spcBef>
+              <a:buClr>
+                <a:schemeClr val="accent1"/>
+              </a:buClr>
+              <a:buSzPct val="100000"/>
+              <a:buFont typeface="Arial" panose="020B0604020202020204" pitchFamily="34" charset="0"/>
+              <a:buChar char="•"/>
+              <a:defRPr sz="1200" kern="1200">
+                <a:solidFill>
+                  <a:schemeClr val="tx1"/>
+                </a:solidFill>
+                <a:effectLst/>
+                <a:latin typeface="+mn-lt"/>
+                <a:ea typeface="+mn-ea"/>
+                <a:cs typeface="+mn-cs"/>
+              </a:defRPr>
+            </a:lvl7pPr>
+            <a:lvl8pPr marL="3429000" indent="-228600" algn="l" defTabSz="914400" rtl="0" eaLnBrk="1" latinLnBrk="0" hangingPunct="1">
+              <a:lnSpc>
+                <a:spcPct val="120000"/>
+              </a:lnSpc>
+              <a:spcBef>
+                <a:spcPts val="500"/>
+              </a:spcBef>
+              <a:buClr>
+                <a:schemeClr val="accent1"/>
+              </a:buClr>
+              <a:buSzPct val="100000"/>
+              <a:buFont typeface="Arial" panose="020B0604020202020204" pitchFamily="34" charset="0"/>
+              <a:buChar char="•"/>
+              <a:defRPr sz="1200" kern="1200" baseline="0">
+                <a:solidFill>
+                  <a:schemeClr val="tx1"/>
+                </a:solidFill>
+                <a:effectLst/>
+                <a:latin typeface="+mn-lt"/>
+                <a:ea typeface="+mn-ea"/>
+                <a:cs typeface="+mn-cs"/>
+              </a:defRPr>
+            </a:lvl8pPr>
+            <a:lvl9pPr marL="3886200" indent="-228600" algn="l" defTabSz="914400" rtl="0" eaLnBrk="1" latinLnBrk="0" hangingPunct="1">
+              <a:lnSpc>
+                <a:spcPct val="120000"/>
+              </a:lnSpc>
+              <a:spcBef>
+                <a:spcPts val="500"/>
+              </a:spcBef>
+              <a:buClr>
+                <a:schemeClr val="accent1"/>
+              </a:buClr>
+              <a:buSzPct val="100000"/>
+              <a:buFont typeface="Arial" panose="020B0604020202020204" pitchFamily="34" charset="0"/>
+              <a:buChar char="•"/>
+              <a:defRPr sz="1200" kern="1200" baseline="0">
+                <a:solidFill>
+                  <a:schemeClr val="tx1"/>
+                </a:solidFill>
+                <a:effectLst/>
+                <a:latin typeface="+mn-lt"/>
+                <a:ea typeface="+mn-ea"/>
+                <a:cs typeface="+mn-cs"/>
+              </a:defRPr>
+            </a:lvl9pPr>
+          </a:lstStyle>
+          <a:p>
+            <a:pPr marL="0" indent="0">
+              <a:buFont typeface="Arial" panose="020B0604020202020204" pitchFamily="34" charset="0"/>
+              <a:buNone/>
+            </a:pPr>
+            <a:endParaRPr lang="en-US" dirty="0" smtClean="0"/>
+          </a:p>
+          <a:p>
+            <a:pPr marL="0" indent="0">
+              <a:buFont typeface="Arial" panose="020B0604020202020204" pitchFamily="34" charset="0"/>
+              <a:buNone/>
+            </a:pPr>
+            <a:r>
+              <a:rPr lang="en-US" dirty="0" smtClean="0"/>
+              <a:t>Page elements and functionalities:</a:t>
+            </a:r>
+          </a:p>
+          <a:p>
+            <a:r>
+              <a:rPr lang="en-US" dirty="0" smtClean="0"/>
+              <a:t>Present a popup by choosing a certain unapproved plug, by clicking the “accept” button</a:t>
+            </a:r>
+          </a:p>
+          <a:p>
+            <a:r>
+              <a:rPr lang="en-US" dirty="0" smtClean="0"/>
+              <a:t>Using said popup, the client determines the settings of the chosen plug</a:t>
+            </a:r>
+          </a:p>
+          <a:p>
+            <a:r>
+              <a:rPr lang="en-US" dirty="0" smtClean="0"/>
+              <a:t>Conveying the client’s  choices to the database and updating the page accordingly by clicking the “next” button from the popup</a:t>
+            </a:r>
+          </a:p>
+          <a:p>
+            <a:r>
+              <a:rPr lang="en-US" dirty="0" smtClean="0"/>
+              <a:t>Removing the popup by clicking on the “cancel” button ,which is located on said popup</a:t>
+            </a:r>
+          </a:p>
+        </p:txBody>
+      </p:sp>
+    </p:spTree>
+    <p:extLst>
+      <p:ext uri="{BB962C8B-B14F-4D97-AF65-F5344CB8AC3E}">
+        <p14:creationId xmlns:p14="http://schemas.microsoft.com/office/powerpoint/2010/main" val="3843954407"/>
+      </p:ext>
+    </p:extLst>
+  </p:cSld>
+  <p:clrMapOvr>
+    <a:masterClrMapping/>
+  </p:clrMapOvr>
+  <p:timing>
+    <p:tnLst>
+      <p:par>
+        <p:cTn id="1" dur="indefinite" restart="never" nodeType="tmRoot"/>
+      </p:par>
+    </p:tnLst>
+  </p:timing>
+</p:sld>
+</file>
+
+<file path=ppt/slides/slide18.xml><?xml version="1.0" encoding="utf-8"?>
+<p:sld xmlns:a="http://schemas.openxmlformats.org/drawingml/2006/main" xmlns:r="http://schemas.openxmlformats.org/officeDocument/2006/relationships" xmlns:p="http://schemas.openxmlformats.org/presentationml/2006/main">
+  <p:cSld>
+    <p:spTree>
+      <p:nvGrpSpPr>
+        <p:cNvPr id="1" name=""/>
+        <p:cNvGrpSpPr/>
+        <p:nvPr/>
+      </p:nvGrpSpPr>
+      <p:grpSpPr>
+        <a:xfrm>
+          <a:off x="0" y="0"/>
+          <a:ext cx="0" cy="0"/>
+          <a:chOff x="0" y="0"/>
+          <a:chExt cx="0" cy="0"/>
+        </a:xfrm>
+      </p:grpSpPr>
+      <p:pic>
+        <p:nvPicPr>
           <p:cNvPr id="6" name="Content Placeholder 5" descr="C:\Users\Aviel\Desktop\סמסטר ב' - 2019\סדנא בהנדסת תוכנה\פרוייקט\תמונות מסך\PlugsSettings - LoggedInWithSidebar.jpg">
             <a:extLst>
               <a:ext uri="{FF2B5EF4-FFF2-40B4-BE49-F238E27FC236}">
@@ -10070,7 +10509,7 @@
 </p:sld>
 </file>
 
-<file path=ppt/slides/slide18.xml><?xml version="1.0" encoding="utf-8"?>
+<file path=ppt/slides/slide19.xml><?xml version="1.0" encoding="utf-8"?>
 <p:sld xmlns:a="http://schemas.openxmlformats.org/drawingml/2006/main" xmlns:r="http://schemas.openxmlformats.org/officeDocument/2006/relationships" xmlns:p="http://schemas.openxmlformats.org/presentationml/2006/main">
   <p:cSld>
     <p:spTree>
@@ -10497,7 +10936,179 @@
 </p:sld>
 </file>
 
-<file path=ppt/slides/slide19.xml><?xml version="1.0" encoding="utf-8"?>
+<file path=ppt/slides/slide2.xml><?xml version="1.0" encoding="utf-8"?>
+<p:sld xmlns:a="http://schemas.openxmlformats.org/drawingml/2006/main" xmlns:r="http://schemas.openxmlformats.org/officeDocument/2006/relationships" xmlns:p="http://schemas.openxmlformats.org/presentationml/2006/main">
+  <p:cSld>
+    <p:spTree>
+      <p:nvGrpSpPr>
+        <p:cNvPr id="1" name=""/>
+        <p:cNvGrpSpPr/>
+        <p:nvPr/>
+      </p:nvGrpSpPr>
+      <p:grpSpPr>
+        <a:xfrm>
+          <a:off x="0" y="0"/>
+          <a:ext cx="0" cy="0"/>
+          <a:chOff x="0" y="0"/>
+          <a:chExt cx="0" cy="0"/>
+        </a:xfrm>
+      </p:grpSpPr>
+      <p:sp>
+        <p:nvSpPr>
+          <p:cNvPr id="3" name="מציין מיקום תוכן 2">
+            <a:extLst>
+              <a:ext uri="{FF2B5EF4-FFF2-40B4-BE49-F238E27FC236}">
+                <a16:creationId xmlns="" xmlns:a16="http://schemas.microsoft.com/office/drawing/2014/main" id="{698DFE09-61A8-4594-BF18-0CEC6811CAC4}"/>
+              </a:ext>
+            </a:extLst>
+          </p:cNvPr>
+          <p:cNvSpPr>
+            <a:spLocks noGrp="1"/>
+          </p:cNvSpPr>
+          <p:nvPr>
+            <p:ph idx="4294967295"/>
+          </p:nvPr>
+        </p:nvSpPr>
+        <p:spPr>
+          <a:xfrm>
+            <a:off x="0" y="1825625"/>
+            <a:ext cx="7886700" cy="4351338"/>
+          </a:xfrm>
+        </p:spPr>
+        <p:txBody>
+          <a:bodyPr>
+            <a:normAutofit fontScale="92500" lnSpcReduction="20000"/>
+          </a:bodyPr>
+          <a:lstStyle/>
+          <a:p>
+            <a:pPr algn="l" rtl="0"/>
+            <a:r>
+              <a:rPr lang="en-US" sz="3200" dirty="0"/>
+              <a:t>Device and Architecture </a:t>
+            </a:r>
+          </a:p>
+          <a:p>
+            <a:pPr marL="0" indent="0" algn="l" rtl="0">
+              <a:buNone/>
+            </a:pPr>
+            <a:endParaRPr lang="en-US" sz="3200" dirty="0"/>
+          </a:p>
+          <a:p>
+            <a:pPr algn="l" rtl="0"/>
+            <a:r>
+              <a:rPr lang="en-US" sz="3200" dirty="0"/>
+              <a:t>Server side, API and Security</a:t>
+            </a:r>
+          </a:p>
+          <a:p>
+            <a:pPr marL="0" indent="0" algn="l" rtl="0">
+              <a:buNone/>
+            </a:pPr>
+            <a:endParaRPr lang="en-US" sz="3200" dirty="0"/>
+          </a:p>
+          <a:p>
+            <a:pPr algn="l" rtl="0"/>
+            <a:r>
+              <a:rPr lang="en-US" sz="3200" dirty="0"/>
+              <a:t>Client side and Web Site</a:t>
+            </a:r>
+          </a:p>
+          <a:p>
+            <a:pPr marL="0" indent="0" algn="l" rtl="0">
+              <a:buNone/>
+            </a:pPr>
+            <a:endParaRPr lang="en-US" sz="3200" dirty="0"/>
+          </a:p>
+          <a:p>
+            <a:pPr algn="l" rtl="0"/>
+            <a:r>
+              <a:rPr lang="en-US" sz="3200" dirty="0"/>
+              <a:t>System Demo view</a:t>
+            </a:r>
+          </a:p>
+          <a:p>
+            <a:pPr algn="l" rtl="0"/>
+            <a:endParaRPr lang="he-IL" dirty="0"/>
+          </a:p>
+        </p:txBody>
+      </p:sp>
+      <p:sp>
+        <p:nvSpPr>
+          <p:cNvPr id="4" name="Title 1">
+            <a:extLst>
+              <a:ext uri="{FF2B5EF4-FFF2-40B4-BE49-F238E27FC236}">
+                <a16:creationId xmlns="" xmlns:a16="http://schemas.microsoft.com/office/drawing/2014/main" id="{3340FA19-5350-4C8D-8473-7DB94F143C43}"/>
+              </a:ext>
+            </a:extLst>
+          </p:cNvPr>
+          <p:cNvSpPr txBox="1">
+            <a:spLocks/>
+          </p:cNvSpPr>
+          <p:nvPr/>
+        </p:nvSpPr>
+        <p:spPr>
+          <a:xfrm>
+            <a:off x="1143000" y="-304800"/>
+            <a:ext cx="6858000" cy="2387600"/>
+          </a:xfrm>
+          <a:prstGeom prst="rect">
+            <a:avLst/>
+          </a:prstGeom>
+        </p:spPr>
+        <p:txBody>
+          <a:bodyPr vert="horz" lIns="91440" tIns="45720" rIns="91440" bIns="45720" rtlCol="0" anchor="ctr">
+            <a:normAutofit/>
+          </a:bodyPr>
+          <a:lstStyle>
+            <a:lvl1pPr algn="ctr" defTabSz="914400" rtl="0" eaLnBrk="1" latinLnBrk="0" hangingPunct="1">
+              <a:lnSpc>
+                <a:spcPct val="90000"/>
+              </a:lnSpc>
+              <a:spcBef>
+                <a:spcPct val="0"/>
+              </a:spcBef>
+              <a:buNone/>
+              <a:defRPr sz="3200" b="0" i="0" kern="1200" cap="all">
+                <a:solidFill>
+                  <a:schemeClr val="accent1"/>
+                </a:solidFill>
+                <a:effectLst/>
+                <a:latin typeface="+mj-lt"/>
+                <a:ea typeface="+mj-ea"/>
+                <a:cs typeface="+mj-cs"/>
+              </a:defRPr>
+            </a:lvl1pPr>
+          </a:lstStyle>
+          <a:p>
+            <a:r>
+              <a:rPr lang="en-US" dirty="0" smtClean="0"/>
+              <a:t>Today we will show you</a:t>
+            </a:r>
+            <a:endParaRPr lang="en-US" dirty="0"/>
+          </a:p>
+        </p:txBody>
+      </p:sp>
+    </p:spTree>
+    <p:extLst>
+      <p:ext uri="{BB962C8B-B14F-4D97-AF65-F5344CB8AC3E}">
+        <p14:creationId xmlns:p14="http://schemas.microsoft.com/office/powerpoint/2010/main" val="1408359820"/>
+      </p:ext>
+    </p:extLst>
+  </p:cSld>
+  <p:clrMapOvr>
+    <a:masterClrMapping/>
+  </p:clrMapOvr>
+  <p:timing>
+    <p:tnLst>
+      <p:par>
+        <p:cTn id="1" dur="indefinite" restart="never" nodeType="tmRoot"/>
+      </p:par>
+    </p:tnLst>
+  </p:timing>
+</p:sld>
+</file>
+
+<file path=ppt/slides/slide20.xml><?xml version="1.0" encoding="utf-8"?>
 <p:sld xmlns:a="http://schemas.openxmlformats.org/drawingml/2006/main" xmlns:r="http://schemas.openxmlformats.org/officeDocument/2006/relationships" xmlns:p="http://schemas.openxmlformats.org/presentationml/2006/main">
   <p:cSld>
     <p:spTree>
@@ -10898,179 +11509,7 @@
 </p:sld>
 </file>
 
-<file path=ppt/slides/slide2.xml><?xml version="1.0" encoding="utf-8"?>
-<p:sld xmlns:a="http://schemas.openxmlformats.org/drawingml/2006/main" xmlns:r="http://schemas.openxmlformats.org/officeDocument/2006/relationships" xmlns:p="http://schemas.openxmlformats.org/presentationml/2006/main">
-  <p:cSld>
-    <p:spTree>
-      <p:nvGrpSpPr>
-        <p:cNvPr id="1" name=""/>
-        <p:cNvGrpSpPr/>
-        <p:nvPr/>
-      </p:nvGrpSpPr>
-      <p:grpSpPr>
-        <a:xfrm>
-          <a:off x="0" y="0"/>
-          <a:ext cx="0" cy="0"/>
-          <a:chOff x="0" y="0"/>
-          <a:chExt cx="0" cy="0"/>
-        </a:xfrm>
-      </p:grpSpPr>
-      <p:sp>
-        <p:nvSpPr>
-          <p:cNvPr id="3" name="מציין מיקום תוכן 2">
-            <a:extLst>
-              <a:ext uri="{FF2B5EF4-FFF2-40B4-BE49-F238E27FC236}">
-                <a16:creationId xmlns="" xmlns:a16="http://schemas.microsoft.com/office/drawing/2014/main" id="{698DFE09-61A8-4594-BF18-0CEC6811CAC4}"/>
-              </a:ext>
-            </a:extLst>
-          </p:cNvPr>
-          <p:cNvSpPr>
-            <a:spLocks noGrp="1"/>
-          </p:cNvSpPr>
-          <p:nvPr>
-            <p:ph idx="4294967295"/>
-          </p:nvPr>
-        </p:nvSpPr>
-        <p:spPr>
-          <a:xfrm>
-            <a:off x="0" y="1825625"/>
-            <a:ext cx="7886700" cy="4351338"/>
-          </a:xfrm>
-        </p:spPr>
-        <p:txBody>
-          <a:bodyPr>
-            <a:normAutofit fontScale="92500" lnSpcReduction="20000"/>
-          </a:bodyPr>
-          <a:lstStyle/>
-          <a:p>
-            <a:pPr algn="l" rtl="0"/>
-            <a:r>
-              <a:rPr lang="en-US" sz="3200" dirty="0"/>
-              <a:t>Device and Architecture </a:t>
-            </a:r>
-          </a:p>
-          <a:p>
-            <a:pPr marL="0" indent="0" algn="l" rtl="0">
-              <a:buNone/>
-            </a:pPr>
-            <a:endParaRPr lang="en-US" sz="3200" dirty="0"/>
-          </a:p>
-          <a:p>
-            <a:pPr algn="l" rtl="0"/>
-            <a:r>
-              <a:rPr lang="en-US" sz="3200" dirty="0"/>
-              <a:t>Server side, API and Security</a:t>
-            </a:r>
-          </a:p>
-          <a:p>
-            <a:pPr marL="0" indent="0" algn="l" rtl="0">
-              <a:buNone/>
-            </a:pPr>
-            <a:endParaRPr lang="en-US" sz="3200" dirty="0"/>
-          </a:p>
-          <a:p>
-            <a:pPr algn="l" rtl="0"/>
-            <a:r>
-              <a:rPr lang="en-US" sz="3200" dirty="0"/>
-              <a:t>Client side and Web Site</a:t>
-            </a:r>
-          </a:p>
-          <a:p>
-            <a:pPr marL="0" indent="0" algn="l" rtl="0">
-              <a:buNone/>
-            </a:pPr>
-            <a:endParaRPr lang="en-US" sz="3200" dirty="0"/>
-          </a:p>
-          <a:p>
-            <a:pPr algn="l" rtl="0"/>
-            <a:r>
-              <a:rPr lang="en-US" sz="3200" dirty="0"/>
-              <a:t>System Demo view</a:t>
-            </a:r>
-          </a:p>
-          <a:p>
-            <a:pPr algn="l" rtl="0"/>
-            <a:endParaRPr lang="he-IL" dirty="0"/>
-          </a:p>
-        </p:txBody>
-      </p:sp>
-      <p:sp>
-        <p:nvSpPr>
-          <p:cNvPr id="4" name="Title 1">
-            <a:extLst>
-              <a:ext uri="{FF2B5EF4-FFF2-40B4-BE49-F238E27FC236}">
-                <a16:creationId xmlns="" xmlns:a16="http://schemas.microsoft.com/office/drawing/2014/main" id="{3340FA19-5350-4C8D-8473-7DB94F143C43}"/>
-              </a:ext>
-            </a:extLst>
-          </p:cNvPr>
-          <p:cNvSpPr txBox="1">
-            <a:spLocks/>
-          </p:cNvSpPr>
-          <p:nvPr/>
-        </p:nvSpPr>
-        <p:spPr>
-          <a:xfrm>
-            <a:off x="1143000" y="-304800"/>
-            <a:ext cx="6858000" cy="2387600"/>
-          </a:xfrm>
-          <a:prstGeom prst="rect">
-            <a:avLst/>
-          </a:prstGeom>
-        </p:spPr>
-        <p:txBody>
-          <a:bodyPr vert="horz" lIns="91440" tIns="45720" rIns="91440" bIns="45720" rtlCol="0" anchor="ctr">
-            <a:normAutofit/>
-          </a:bodyPr>
-          <a:lstStyle>
-            <a:lvl1pPr algn="ctr" defTabSz="914400" rtl="0" eaLnBrk="1" latinLnBrk="0" hangingPunct="1">
-              <a:lnSpc>
-                <a:spcPct val="90000"/>
-              </a:lnSpc>
-              <a:spcBef>
-                <a:spcPct val="0"/>
-              </a:spcBef>
-              <a:buNone/>
-              <a:defRPr sz="3200" b="0" i="0" kern="1200" cap="all">
-                <a:solidFill>
-                  <a:schemeClr val="accent1"/>
-                </a:solidFill>
-                <a:effectLst/>
-                <a:latin typeface="+mj-lt"/>
-                <a:ea typeface="+mj-ea"/>
-                <a:cs typeface="+mj-cs"/>
-              </a:defRPr>
-            </a:lvl1pPr>
-          </a:lstStyle>
-          <a:p>
-            <a:r>
-              <a:rPr lang="en-US" dirty="0" smtClean="0"/>
-              <a:t>Today we will show you</a:t>
-            </a:r>
-            <a:endParaRPr lang="en-US" dirty="0"/>
-          </a:p>
-        </p:txBody>
-      </p:sp>
-    </p:spTree>
-    <p:extLst>
-      <p:ext uri="{BB962C8B-B14F-4D97-AF65-F5344CB8AC3E}">
-        <p14:creationId xmlns:p14="http://schemas.microsoft.com/office/powerpoint/2010/main" val="1408359820"/>
-      </p:ext>
-    </p:extLst>
-  </p:cSld>
-  <p:clrMapOvr>
-    <a:masterClrMapping/>
-  </p:clrMapOvr>
-  <p:timing>
-    <p:tnLst>
-      <p:par>
-        <p:cTn id="1" dur="indefinite" restart="never" nodeType="tmRoot"/>
-      </p:par>
-    </p:tnLst>
-  </p:timing>
-</p:sld>
-</file>
-
-<file path=ppt/slides/slide20.xml><?xml version="1.0" encoding="utf-8"?>
+<file path=ppt/slides/slide21.xml><?xml version="1.0" encoding="utf-8"?>
 <p:sld xmlns:a="http://schemas.openxmlformats.org/drawingml/2006/main" xmlns:r="http://schemas.openxmlformats.org/officeDocument/2006/relationships" xmlns:p="http://schemas.openxmlformats.org/presentationml/2006/main">
   <p:cSld>
     <p:spTree>
@@ -11214,164 +11653,6 @@
     <p:extLst>
       <p:ext uri="{BB962C8B-B14F-4D97-AF65-F5344CB8AC3E}">
         <p14:creationId xmlns:p14="http://schemas.microsoft.com/office/powerpoint/2010/main" val="2410576803"/>
-      </p:ext>
-    </p:extLst>
-  </p:cSld>
-  <p:clrMapOvr>
-    <a:masterClrMapping/>
-  </p:clrMapOvr>
-  <p:timing>
-    <p:tnLst>
-      <p:par>
-        <p:cTn id="1" dur="indefinite" restart="never" nodeType="tmRoot"/>
-      </p:par>
-    </p:tnLst>
-  </p:timing>
-</p:sld>
-</file>
-
-<file path=ppt/slides/slide21.xml><?xml version="1.0" encoding="utf-8"?>
-<p:sld xmlns:a="http://schemas.openxmlformats.org/drawingml/2006/main" xmlns:r="http://schemas.openxmlformats.org/officeDocument/2006/relationships" xmlns:p="http://schemas.openxmlformats.org/presentationml/2006/main">
-  <p:cSld>
-    <p:spTree>
-      <p:nvGrpSpPr>
-        <p:cNvPr id="1" name=""/>
-        <p:cNvGrpSpPr/>
-        <p:nvPr/>
-      </p:nvGrpSpPr>
-      <p:grpSpPr>
-        <a:xfrm>
-          <a:off x="0" y="0"/>
-          <a:ext cx="0" cy="0"/>
-          <a:chOff x="0" y="0"/>
-          <a:chExt cx="0" cy="0"/>
-        </a:xfrm>
-      </p:grpSpPr>
-      <p:pic>
-        <p:nvPicPr>
-          <p:cNvPr id="7" name="מציין מיקום תוכן 6">
-            <a:extLst>
-              <a:ext uri="{FF2B5EF4-FFF2-40B4-BE49-F238E27FC236}">
-                <a16:creationId xmlns="" xmlns:a16="http://schemas.microsoft.com/office/drawing/2014/main" id="{3A2740AC-634A-43F2-8283-D8CE53037153}"/>
-              </a:ext>
-            </a:extLst>
-          </p:cNvPr>
-          <p:cNvPicPr>
-            <a:picLocks noGrp="1" noChangeAspect="1"/>
-          </p:cNvPicPr>
-          <p:nvPr>
-            <p:ph idx="4294967295"/>
-          </p:nvPr>
-        </p:nvPicPr>
-        <p:blipFill rotWithShape="1">
-          <a:blip r:embed="rId2"/>
-          <a:srcRect t="11065" r="1988" b="5525"/>
-          <a:stretch/>
-        </p:blipFill>
-        <p:spPr>
-          <a:xfrm>
-            <a:off x="914400" y="2057400"/>
-            <a:ext cx="7099300" cy="4528476"/>
-          </a:xfrm>
-          <a:prstGeom prst="rect">
-            <a:avLst/>
-          </a:prstGeom>
-        </p:spPr>
-      </p:pic>
-      <p:sp>
-        <p:nvSpPr>
-          <p:cNvPr id="6" name="תיבת טקסט 5">
-            <a:extLst>
-              <a:ext uri="{FF2B5EF4-FFF2-40B4-BE49-F238E27FC236}">
-                <a16:creationId xmlns="" xmlns:a16="http://schemas.microsoft.com/office/drawing/2014/main" id="{6F53886E-BACB-40EC-804C-B4E03AA9CC9B}"/>
-              </a:ext>
-            </a:extLst>
-          </p:cNvPr>
-          <p:cNvSpPr txBox="1"/>
-          <p:nvPr/>
-        </p:nvSpPr>
-        <p:spPr>
-          <a:xfrm>
-            <a:off x="467140" y="1219202"/>
-            <a:ext cx="8140148" cy="646331"/>
-          </a:xfrm>
-          <a:prstGeom prst="rect">
-            <a:avLst/>
-          </a:prstGeom>
-          <a:noFill/>
-        </p:spPr>
-        <p:txBody>
-          <a:bodyPr wrap="square" rtlCol="1">
-            <a:spAutoFit/>
-          </a:bodyPr>
-          <a:lstStyle/>
-          <a:p>
-            <a:pPr rtl="1"/>
-            <a:r>
-              <a:rPr lang="en-US" dirty="0"/>
-              <a:t>In this page we can see how much did it cost using this device according to the power and the cost of one KW</a:t>
-            </a:r>
-            <a:r>
-              <a:rPr lang="he-IL" dirty="0"/>
-              <a:t> </a:t>
-            </a:r>
-          </a:p>
-        </p:txBody>
-      </p:sp>
-      <p:sp>
-        <p:nvSpPr>
-          <p:cNvPr id="5" name="Title 1"/>
-          <p:cNvSpPr txBox="1">
-            <a:spLocks/>
-          </p:cNvSpPr>
-          <p:nvPr/>
-        </p:nvSpPr>
-        <p:spPr>
-          <a:xfrm>
-            <a:off x="609600" y="381000"/>
-            <a:ext cx="7886700" cy="1325563"/>
-          </a:xfrm>
-          <a:prstGeom prst="rect">
-            <a:avLst/>
-          </a:prstGeom>
-        </p:spPr>
-        <p:txBody>
-          <a:bodyPr vert="horz" lIns="91440" tIns="45720" rIns="91440" bIns="45720" rtlCol="0" anchor="ctr">
-            <a:normAutofit/>
-          </a:bodyPr>
-          <a:lstStyle>
-            <a:lvl1pPr algn="ctr" defTabSz="914400" rtl="0" eaLnBrk="1" latinLnBrk="0" hangingPunct="1">
-              <a:lnSpc>
-                <a:spcPct val="90000"/>
-              </a:lnSpc>
-              <a:spcBef>
-                <a:spcPct val="0"/>
-              </a:spcBef>
-              <a:buNone/>
-              <a:defRPr sz="3200" b="0" i="0" kern="1200" cap="all">
-                <a:solidFill>
-                  <a:schemeClr val="accent1"/>
-                </a:solidFill>
-                <a:effectLst/>
-                <a:latin typeface="+mj-lt"/>
-                <a:ea typeface="+mj-ea"/>
-                <a:cs typeface="+mj-cs"/>
-              </a:defRPr>
-            </a:lvl1pPr>
-          </a:lstStyle>
-          <a:p>
-            <a:r>
-              <a:rPr lang="en-US" dirty="0" smtClean="0"/>
-              <a:t>Power consumption</a:t>
-            </a:r>
-            <a:endParaRPr lang="he-IL" dirty="0"/>
-          </a:p>
-        </p:txBody>
-      </p:sp>
-    </p:spTree>
-    <p:extLst>
-      <p:ext uri="{BB962C8B-B14F-4D97-AF65-F5344CB8AC3E}">
-        <p14:creationId xmlns:p14="http://schemas.microsoft.com/office/powerpoint/2010/main" val="1027595518"/>
       </p:ext>
     </p:extLst>
   </p:cSld>
@@ -11405,6 +11686,164 @@
           <a:chExt cx="0" cy="0"/>
         </a:xfrm>
       </p:grpSpPr>
+      <p:pic>
+        <p:nvPicPr>
+          <p:cNvPr id="7" name="מציין מיקום תוכן 6">
+            <a:extLst>
+              <a:ext uri="{FF2B5EF4-FFF2-40B4-BE49-F238E27FC236}">
+                <a16:creationId xmlns="" xmlns:a16="http://schemas.microsoft.com/office/drawing/2014/main" id="{3A2740AC-634A-43F2-8283-D8CE53037153}"/>
+              </a:ext>
+            </a:extLst>
+          </p:cNvPr>
+          <p:cNvPicPr>
+            <a:picLocks noGrp="1" noChangeAspect="1"/>
+          </p:cNvPicPr>
+          <p:nvPr>
+            <p:ph idx="4294967295"/>
+          </p:nvPr>
+        </p:nvPicPr>
+        <p:blipFill rotWithShape="1">
+          <a:blip r:embed="rId2"/>
+          <a:srcRect t="11065" r="1988" b="5525"/>
+          <a:stretch/>
+        </p:blipFill>
+        <p:spPr>
+          <a:xfrm>
+            <a:off x="914400" y="2057400"/>
+            <a:ext cx="7099300" cy="4528476"/>
+          </a:xfrm>
+          <a:prstGeom prst="rect">
+            <a:avLst/>
+          </a:prstGeom>
+        </p:spPr>
+      </p:pic>
+      <p:sp>
+        <p:nvSpPr>
+          <p:cNvPr id="6" name="תיבת טקסט 5">
+            <a:extLst>
+              <a:ext uri="{FF2B5EF4-FFF2-40B4-BE49-F238E27FC236}">
+                <a16:creationId xmlns="" xmlns:a16="http://schemas.microsoft.com/office/drawing/2014/main" id="{6F53886E-BACB-40EC-804C-B4E03AA9CC9B}"/>
+              </a:ext>
+            </a:extLst>
+          </p:cNvPr>
+          <p:cNvSpPr txBox="1"/>
+          <p:nvPr/>
+        </p:nvSpPr>
+        <p:spPr>
+          <a:xfrm>
+            <a:off x="467140" y="1219202"/>
+            <a:ext cx="8140148" cy="646331"/>
+          </a:xfrm>
+          <a:prstGeom prst="rect">
+            <a:avLst/>
+          </a:prstGeom>
+          <a:noFill/>
+        </p:spPr>
+        <p:txBody>
+          <a:bodyPr wrap="square" rtlCol="1">
+            <a:spAutoFit/>
+          </a:bodyPr>
+          <a:lstStyle/>
+          <a:p>
+            <a:pPr rtl="1"/>
+            <a:r>
+              <a:rPr lang="en-US" dirty="0"/>
+              <a:t>In this page we can see how much did it cost using this device according to the power and the cost of one KW</a:t>
+            </a:r>
+            <a:r>
+              <a:rPr lang="he-IL" dirty="0"/>
+              <a:t> </a:t>
+            </a:r>
+          </a:p>
+        </p:txBody>
+      </p:sp>
+      <p:sp>
+        <p:nvSpPr>
+          <p:cNvPr id="5" name="Title 1"/>
+          <p:cNvSpPr txBox="1">
+            <a:spLocks/>
+          </p:cNvSpPr>
+          <p:nvPr/>
+        </p:nvSpPr>
+        <p:spPr>
+          <a:xfrm>
+            <a:off x="609600" y="381000"/>
+            <a:ext cx="7886700" cy="1325563"/>
+          </a:xfrm>
+          <a:prstGeom prst="rect">
+            <a:avLst/>
+          </a:prstGeom>
+        </p:spPr>
+        <p:txBody>
+          <a:bodyPr vert="horz" lIns="91440" tIns="45720" rIns="91440" bIns="45720" rtlCol="0" anchor="ctr">
+            <a:normAutofit/>
+          </a:bodyPr>
+          <a:lstStyle>
+            <a:lvl1pPr algn="ctr" defTabSz="914400" rtl="0" eaLnBrk="1" latinLnBrk="0" hangingPunct="1">
+              <a:lnSpc>
+                <a:spcPct val="90000"/>
+              </a:lnSpc>
+              <a:spcBef>
+                <a:spcPct val="0"/>
+              </a:spcBef>
+              <a:buNone/>
+              <a:defRPr sz="3200" b="0" i="0" kern="1200" cap="all">
+                <a:solidFill>
+                  <a:schemeClr val="accent1"/>
+                </a:solidFill>
+                <a:effectLst/>
+                <a:latin typeface="+mj-lt"/>
+                <a:ea typeface="+mj-ea"/>
+                <a:cs typeface="+mj-cs"/>
+              </a:defRPr>
+            </a:lvl1pPr>
+          </a:lstStyle>
+          <a:p>
+            <a:r>
+              <a:rPr lang="en-US" dirty="0" smtClean="0"/>
+              <a:t>Power consumption</a:t>
+            </a:r>
+            <a:endParaRPr lang="he-IL" dirty="0"/>
+          </a:p>
+        </p:txBody>
+      </p:sp>
+    </p:spTree>
+    <p:extLst>
+      <p:ext uri="{BB962C8B-B14F-4D97-AF65-F5344CB8AC3E}">
+        <p14:creationId xmlns:p14="http://schemas.microsoft.com/office/powerpoint/2010/main" val="1027595518"/>
+      </p:ext>
+    </p:extLst>
+  </p:cSld>
+  <p:clrMapOvr>
+    <a:masterClrMapping/>
+  </p:clrMapOvr>
+  <p:timing>
+    <p:tnLst>
+      <p:par>
+        <p:cTn id="1" dur="indefinite" restart="never" nodeType="tmRoot"/>
+      </p:par>
+    </p:tnLst>
+  </p:timing>
+</p:sld>
+</file>
+
+<file path=ppt/slides/slide23.xml><?xml version="1.0" encoding="utf-8"?>
+<p:sld xmlns:a="http://schemas.openxmlformats.org/drawingml/2006/main" xmlns:r="http://schemas.openxmlformats.org/officeDocument/2006/relationships" xmlns:p="http://schemas.openxmlformats.org/presentationml/2006/main">
+  <p:cSld>
+    <p:spTree>
+      <p:nvGrpSpPr>
+        <p:cNvPr id="1" name=""/>
+        <p:cNvGrpSpPr/>
+        <p:nvPr/>
+      </p:nvGrpSpPr>
+      <p:grpSpPr>
+        <a:xfrm>
+          <a:off x="0" y="0"/>
+          <a:ext cx="0" cy="0"/>
+          <a:chOff x="0" y="0"/>
+          <a:chExt cx="0" cy="0"/>
+        </a:xfrm>
+      </p:grpSpPr>
       <p:sp>
         <p:nvSpPr>
           <p:cNvPr id="2" name="Title 1"/>
@@ -11453,7 +11892,7 @@
 </p:sld>
 </file>
 
-<file path=ppt/slides/slide23.xml><?xml version="1.0" encoding="utf-8"?>
+<file path=ppt/slides/slide24.xml><?xml version="1.0" encoding="utf-8"?>
 <p:sld xmlns:a="http://schemas.openxmlformats.org/drawingml/2006/main" xmlns:r="http://schemas.openxmlformats.org/officeDocument/2006/relationships" xmlns:p="http://schemas.openxmlformats.org/presentationml/2006/main">
   <p:cSld>
     <p:spTree>
@@ -11874,6 +12313,13 @@
   <p:clrMapOvr>
     <a:masterClrMapping/>
   </p:clrMapOvr>
+  <p:timing>
+    <p:tnLst>
+      <p:par>
+        <p:cTn id="1" dur="indefinite" restart="never" nodeType="tmRoot"/>
+      </p:par>
+    </p:tnLst>
+  </p:timing>
 </p:sld>
 </file>
 

</xml_diff>